<commit_message>
* added slide for CI support
</commit_message>
<xml_diff>
--- a/slides/Effective.Unit.Testing.For.Native.iOS.Apps.pptx
+++ b/slides/Effective.Unit.Testing.For.Native.iOS.Apps.pptx
@@ -5,7 +5,7 @@
     <p:sldMasterId id="2147483660" r:id="rId1"/>
   </p:sldMasterIdLst>
   <p:notesMasterIdLst>
-    <p:notesMasterId r:id="rId24"/>
+    <p:notesMasterId r:id="rId25"/>
   </p:notesMasterIdLst>
   <p:sldIdLst>
     <p:sldId id="256" r:id="rId2"/>
@@ -29,7 +29,8 @@
     <p:sldId id="291" r:id="rId20"/>
     <p:sldId id="292" r:id="rId21"/>
     <p:sldId id="293" r:id="rId22"/>
-    <p:sldId id="294" r:id="rId23"/>
+    <p:sldId id="297" r:id="rId23"/>
+    <p:sldId id="294" r:id="rId24"/>
   </p:sldIdLst>
   <p:sldSz cx="9144000" cy="6858000" type="screen4x3"/>
   <p:notesSz cx="6858000" cy="9144000"/>
@@ -213,7 +214,7 @@
           <a:p>
             <a:fld id="{E71A540B-006A-FF4A-B2EB-47D07F273EDC}" type="datetimeFigureOut">
               <a:rPr lang="en-US" smtClean="0"/>
-              <a:t>11/5/12</a:t>
+              <a:t>11/8/12</a:t>
             </a:fld>
             <a:endParaRPr lang="en-US"/>
           </a:p>
@@ -1753,6 +1754,98 @@
 </p:notes>
 </file>
 
+<file path=ppt/notesSlides/notesSlide22.xml><?xml version="1.0" encoding="utf-8"?>
+<p:notes xmlns:a="http://schemas.openxmlformats.org/drawingml/2006/main" xmlns:r="http://schemas.openxmlformats.org/officeDocument/2006/relationships" xmlns:p="http://schemas.openxmlformats.org/presentationml/2006/main">
+  <p:cSld>
+    <p:spTree>
+      <p:nvGrpSpPr>
+        <p:cNvPr id="1" name=""/>
+        <p:cNvGrpSpPr/>
+        <p:nvPr/>
+      </p:nvGrpSpPr>
+      <p:grpSpPr>
+        <a:xfrm>
+          <a:off x="0" y="0"/>
+          <a:ext cx="0" cy="0"/>
+          <a:chOff x="0" y="0"/>
+          <a:chExt cx="0" cy="0"/>
+        </a:xfrm>
+      </p:grpSpPr>
+      <p:sp>
+        <p:nvSpPr>
+          <p:cNvPr id="2" name="Slide Image Placeholder 1"/>
+          <p:cNvSpPr>
+            <a:spLocks noGrp="1" noRot="1" noChangeAspect="1"/>
+          </p:cNvSpPr>
+          <p:nvPr>
+            <p:ph type="sldImg"/>
+          </p:nvPr>
+        </p:nvSpPr>
+        <p:spPr/>
+      </p:sp>
+      <p:sp>
+        <p:nvSpPr>
+          <p:cNvPr id="3" name="Notes Placeholder 2"/>
+          <p:cNvSpPr>
+            <a:spLocks noGrp="1"/>
+          </p:cNvSpPr>
+          <p:nvPr>
+            <p:ph type="body" idx="1"/>
+          </p:nvPr>
+        </p:nvSpPr>
+        <p:spPr/>
+        <p:txBody>
+          <a:bodyPr/>
+          <a:lstStyle/>
+          <a:p>
+            <a:r>
+              <a:rPr lang="en-US" dirty="0" smtClean="0"/>
+              <a:t>550K</a:t>
+            </a:r>
+            <a:r>
+              <a:rPr lang="en-US" baseline="0" dirty="0" smtClean="0"/>
+              <a:t> new devices registered every day…</a:t>
+            </a:r>
+            <a:endParaRPr lang="en-US" dirty="0"/>
+          </a:p>
+        </p:txBody>
+      </p:sp>
+      <p:sp>
+        <p:nvSpPr>
+          <p:cNvPr id="4" name="Slide Number Placeholder 3"/>
+          <p:cNvSpPr>
+            <a:spLocks noGrp="1"/>
+          </p:cNvSpPr>
+          <p:nvPr>
+            <p:ph type="sldNum" sz="quarter" idx="10"/>
+          </p:nvPr>
+        </p:nvSpPr>
+        <p:spPr/>
+        <p:txBody>
+          <a:bodyPr/>
+          <a:lstStyle/>
+          <a:p>
+            <a:fld id="{BC242196-6CAE-D349-8B96-ED59283868F3}" type="slidenum">
+              <a:rPr lang="en-US" smtClean="0"/>
+              <a:t>23</a:t>
+            </a:fld>
+            <a:endParaRPr lang="en-US"/>
+          </a:p>
+        </p:txBody>
+      </p:sp>
+    </p:spTree>
+    <p:extLst>
+      <p:ext uri="{BB962C8B-B14F-4D97-AF65-F5344CB8AC3E}">
+        <p14:creationId xmlns:p14="http://schemas.microsoft.com/office/powerpoint/2010/main" val="1552470365"/>
+      </p:ext>
+    </p:extLst>
+  </p:cSld>
+  <p:clrMapOvr>
+    <a:masterClrMapping/>
+  </p:clrMapOvr>
+</p:notes>
+</file>
+
 <file path=ppt/notesSlides/notesSlide3.xml><?xml version="1.0" encoding="utf-8"?>
 <p:notes xmlns:a="http://schemas.openxmlformats.org/drawingml/2006/main" xmlns:r="http://schemas.openxmlformats.org/officeDocument/2006/relationships" xmlns:p="http://schemas.openxmlformats.org/presentationml/2006/main">
   <p:cSld>
@@ -2641,7 +2734,7 @@
           <a:p>
             <a:fld id="{D7C3A134-F1C3-464B-BF47-54DC2DE08F52}" type="datetimeFigureOut">
               <a:rPr lang="en-US" smtClean="0"/>
-              <a:t>11/5/12</a:t>
+              <a:t>11/8/12</a:t>
             </a:fld>
             <a:endParaRPr lang="en-US"/>
           </a:p>
@@ -2864,7 +2957,7 @@
           <a:p>
             <a:fld id="{D7C3A134-F1C3-464B-BF47-54DC2DE08F52}" type="datetimeFigureOut">
               <a:rPr lang="en-US" smtClean="0"/>
-              <a:t>11/5/12</a:t>
+              <a:t>11/8/12</a:t>
             </a:fld>
             <a:endParaRPr lang="en-US"/>
           </a:p>
@@ -3144,7 +3237,7 @@
           <a:p>
             <a:fld id="{D7C3A134-F1C3-464B-BF47-54DC2DE08F52}" type="datetimeFigureOut">
               <a:rPr lang="en-US" smtClean="0"/>
-              <a:t>11/5/12</a:t>
+              <a:t>11/8/12</a:t>
             </a:fld>
             <a:endParaRPr lang="en-US"/>
           </a:p>
@@ -3323,7 +3416,7 @@
           <a:p>
             <a:fld id="{D7C3A134-F1C3-464B-BF47-54DC2DE08F52}" type="datetimeFigureOut">
               <a:rPr lang="en-US" smtClean="0"/>
-              <a:t>11/5/12</a:t>
+              <a:t>11/8/12</a:t>
             </a:fld>
             <a:endParaRPr lang="en-US"/>
           </a:p>
@@ -3681,7 +3774,7 @@
           <a:p>
             <a:fld id="{D7C3A134-F1C3-464B-BF47-54DC2DE08F52}" type="datetimeFigureOut">
               <a:rPr lang="en-US" smtClean="0"/>
-              <a:t>11/5/12</a:t>
+              <a:t>11/8/12</a:t>
             </a:fld>
             <a:endParaRPr lang="en-US"/>
           </a:p>
@@ -3968,7 +4061,7 @@
           <a:p>
             <a:fld id="{D7C3A134-F1C3-464B-BF47-54DC2DE08F52}" type="datetimeFigureOut">
               <a:rPr lang="en-US" smtClean="0"/>
-              <a:t>11/5/12</a:t>
+              <a:t>11/8/12</a:t>
             </a:fld>
             <a:endParaRPr lang="en-US"/>
           </a:p>
@@ -4390,7 +4483,7 @@
           <a:p>
             <a:fld id="{D7C3A134-F1C3-464B-BF47-54DC2DE08F52}" type="datetimeFigureOut">
               <a:rPr lang="en-US" smtClean="0"/>
-              <a:t>11/5/12</a:t>
+              <a:t>11/8/12</a:t>
             </a:fld>
             <a:endParaRPr lang="en-US"/>
           </a:p>
@@ -4505,7 +4598,7 @@
           <a:p>
             <a:fld id="{D7C3A134-F1C3-464B-BF47-54DC2DE08F52}" type="datetimeFigureOut">
               <a:rPr lang="en-US" smtClean="0"/>
-              <a:t>11/5/12</a:t>
+              <a:t>11/8/12</a:t>
             </a:fld>
             <a:endParaRPr lang="en-US"/>
           </a:p>
@@ -4595,7 +4688,7 @@
           <a:p>
             <a:fld id="{D7C3A134-F1C3-464B-BF47-54DC2DE08F52}" type="datetimeFigureOut">
               <a:rPr lang="en-US" smtClean="0"/>
-              <a:t>11/5/12</a:t>
+              <a:t>11/8/12</a:t>
             </a:fld>
             <a:endParaRPr lang="en-US"/>
           </a:p>
@@ -4873,7 +4966,7 @@
           <a:p>
             <a:fld id="{D7C3A134-F1C3-464B-BF47-54DC2DE08F52}" type="datetimeFigureOut">
               <a:rPr lang="en-US" smtClean="0"/>
-              <a:t>11/5/12</a:t>
+              <a:t>11/8/12</a:t>
             </a:fld>
             <a:endParaRPr lang="en-US"/>
           </a:p>
@@ -5239,7 +5332,7 @@
           <a:p>
             <a:fld id="{D7C3A134-F1C3-464B-BF47-54DC2DE08F52}" type="datetimeFigureOut">
               <a:rPr lang="en-US" smtClean="0"/>
-              <a:t>11/5/12</a:t>
+              <a:t>11/8/12</a:t>
             </a:fld>
             <a:endParaRPr lang="en-US" dirty="0"/>
           </a:p>
@@ -5676,7 +5769,7 @@
           <a:p>
             <a:fld id="{D7C3A134-F1C3-464B-BF47-54DC2DE08F52}" type="datetimeFigureOut">
               <a:rPr lang="en-US" smtClean="0"/>
-              <a:t>11/5/12</a:t>
+              <a:t>11/8/12</a:t>
             </a:fld>
             <a:endParaRPr lang="en-US" dirty="0"/>
           </a:p>
@@ -6375,11 +6468,7 @@
           <a:p>
             <a:r>
               <a:rPr lang="en-US" dirty="0" smtClean="0"/>
-              <a:t>Powerful assertions</a:t>
-            </a:r>
-            <a:r>
-              <a:rPr lang="en-US" dirty="0" smtClean="0"/>
-              <a:t>	</a:t>
+              <a:t>Powerful assertions	</a:t>
             </a:r>
             <a:endParaRPr lang="en-US" dirty="0"/>
           </a:p>
@@ -6615,11 +6704,7 @@
             </a:r>
             <a:r>
               <a:rPr lang="en-US" sz="1800" i="1" dirty="0" smtClean="0"/>
-              <a:t>	</a:t>
-            </a:r>
-            <a:r>
-              <a:rPr lang="en-US" sz="1800" i="1" dirty="0" smtClean="0"/>
-              <a:t>* Also add the </a:t>
+              <a:t>	* Also add the </a:t>
             </a:r>
             <a:r>
               <a:rPr lang="en-US" sz="1800" i="1" dirty="0" err="1" smtClean="0"/>
@@ -6629,7 +6714,6 @@
               <a:rPr lang="en-US" sz="1800" i="1" dirty="0" smtClean="0"/>
               <a:t> framework</a:t>
             </a:r>
-            <a:endParaRPr lang="en-US" sz="1800" i="1" dirty="0" smtClean="0"/>
           </a:p>
         </p:txBody>
       </p:sp>
@@ -8559,13 +8643,6 @@
               </a:rPr>
               <a:t>(LENGTH));</a:t>
             </a:r>
-            <a:endParaRPr lang="en-US" sz="1600" dirty="0">
-              <a:solidFill>
-                <a:srgbClr val="000090"/>
-              </a:solidFill>
-              <a:latin typeface="Monaco"/>
-              <a:cs typeface="Monaco"/>
-            </a:endParaRPr>
           </a:p>
         </p:txBody>
       </p:sp>
@@ -8875,11 +8952,7 @@
           <a:p>
             <a:r>
               <a:rPr lang="en-US" dirty="0" smtClean="0"/>
-              <a:t>What do we need?</a:t>
-            </a:r>
-            <a:r>
-              <a:rPr lang="en-US" dirty="0" smtClean="0"/>
-              <a:t>	</a:t>
+              <a:t>What do we need?	</a:t>
             </a:r>
             <a:endParaRPr lang="en-US" dirty="0"/>
           </a:p>
@@ -8914,11 +8987,7 @@
             </a:pPr>
             <a:r>
               <a:rPr lang="en-US" dirty="0" smtClean="0"/>
-              <a:t>Basic </a:t>
-            </a:r>
-            <a:r>
-              <a:rPr lang="en-US" dirty="0" smtClean="0"/>
-              <a:t>unit-test patterns</a:t>
+              <a:t>Basic unit-test patterns</a:t>
             </a:r>
             <a:endParaRPr lang="en-US" dirty="0"/>
           </a:p>
@@ -9050,11 +9119,7 @@
           <a:p>
             <a:r>
               <a:rPr lang="en-US" sz="4000" dirty="0" smtClean="0"/>
-              <a:t>Wha</a:t>
-            </a:r>
-            <a:r>
-              <a:rPr lang="en-US" sz="4000" dirty="0" smtClean="0"/>
-              <a:t>t are we testing?</a:t>
+              <a:t>What are we testing?</a:t>
             </a:r>
             <a:endParaRPr lang="en-US" sz="1800" dirty="0">
               <a:solidFill>
@@ -9384,6 +9449,258 @@
           <a:p>
             <a:r>
               <a:rPr lang="en-US" sz="4000" dirty="0" smtClean="0"/>
+              <a:t>Continuous  Integration - Jenkins</a:t>
+            </a:r>
+            <a:endParaRPr lang="en-US" sz="1800" dirty="0">
+              <a:solidFill>
+                <a:schemeClr val="bg1"/>
+              </a:solidFill>
+            </a:endParaRPr>
+          </a:p>
+        </p:txBody>
+      </p:sp>
+      <p:sp>
+        <p:nvSpPr>
+          <p:cNvPr id="4" name="TextBox 3"/>
+          <p:cNvSpPr txBox="1"/>
+          <p:nvPr/>
+        </p:nvSpPr>
+        <p:spPr>
+          <a:xfrm>
+            <a:off x="457200" y="1877049"/>
+            <a:ext cx="8432346" cy="2185214"/>
+          </a:xfrm>
+          <a:prstGeom prst="rect">
+            <a:avLst/>
+          </a:prstGeom>
+          <a:noFill/>
+        </p:spPr>
+        <p:txBody>
+          <a:bodyPr wrap="square" rtlCol="0">
+            <a:spAutoFit/>
+          </a:bodyPr>
+          <a:lstStyle/>
+          <a:p>
+            <a:pPr marL="285750" indent="-285750">
+              <a:buFont typeface="Wingdings" charset="2"/>
+              <a:buChar char="§"/>
+            </a:pPr>
+            <a:r>
+              <a:rPr lang="en-US" sz="2400" dirty="0" smtClean="0"/>
+              <a:t>Run the tests from the command line:</a:t>
+            </a:r>
+          </a:p>
+          <a:p>
+            <a:pPr marL="285750" indent="-285750">
+              <a:buFont typeface="Wingdings" charset="2"/>
+              <a:buChar char="§"/>
+            </a:pPr>
+            <a:endParaRPr lang="en-US" sz="2400" dirty="0"/>
+          </a:p>
+          <a:p>
+            <a:r>
+              <a:rPr lang="en-US" sz="1600" dirty="0">
+                <a:solidFill>
+                  <a:srgbClr val="000090"/>
+                </a:solidFill>
+                <a:latin typeface="Monaco"/>
+                <a:cs typeface="Monaco"/>
+              </a:rPr>
+              <a:t>GHUNIT_CLI</a:t>
+            </a:r>
+            <a:r>
+              <a:rPr lang="en-US" sz="1600" dirty="0" smtClean="0">
+                <a:solidFill>
+                  <a:srgbClr val="000090"/>
+                </a:solidFill>
+                <a:latin typeface="Monaco"/>
+                <a:cs typeface="Monaco"/>
+              </a:rPr>
+              <a:t>=1 </a:t>
+            </a:r>
+            <a:r>
+              <a:rPr lang="en-US" sz="1600" dirty="0" err="1">
+                <a:solidFill>
+                  <a:srgbClr val="000090"/>
+                </a:solidFill>
+                <a:latin typeface="Monaco"/>
+                <a:cs typeface="Monaco"/>
+              </a:rPr>
+              <a:t>xcodebuild</a:t>
+            </a:r>
+            <a:r>
+              <a:rPr lang="en-US" sz="1600" dirty="0">
+                <a:solidFill>
+                  <a:srgbClr val="000090"/>
+                </a:solidFill>
+                <a:latin typeface="Monaco"/>
+                <a:cs typeface="Monaco"/>
+              </a:rPr>
+              <a:t> -target </a:t>
+            </a:r>
+            <a:r>
+              <a:rPr lang="en-US" sz="1600" dirty="0" err="1">
+                <a:solidFill>
+                  <a:srgbClr val="000090"/>
+                </a:solidFill>
+                <a:latin typeface="Monaco"/>
+                <a:cs typeface="Monaco"/>
+              </a:rPr>
+              <a:t>InfoLunchTest</a:t>
+            </a:r>
+            <a:r>
+              <a:rPr lang="en-US" sz="1600" dirty="0">
+                <a:solidFill>
+                  <a:srgbClr val="000090"/>
+                </a:solidFill>
+                <a:latin typeface="Monaco"/>
+                <a:cs typeface="Monaco"/>
+              </a:rPr>
+              <a:t> -configuration Debug -</a:t>
+            </a:r>
+            <a:r>
+              <a:rPr lang="en-US" sz="1600" dirty="0" err="1">
+                <a:solidFill>
+                  <a:srgbClr val="000090"/>
+                </a:solidFill>
+                <a:latin typeface="Monaco"/>
+                <a:cs typeface="Monaco"/>
+              </a:rPr>
+              <a:t>sdk</a:t>
+            </a:r>
+            <a:r>
+              <a:rPr lang="en-US" sz="1600" dirty="0">
+                <a:solidFill>
+                  <a:srgbClr val="000090"/>
+                </a:solidFill>
+                <a:latin typeface="Monaco"/>
+                <a:cs typeface="Monaco"/>
+              </a:rPr>
+              <a:t> </a:t>
+            </a:r>
+            <a:r>
+              <a:rPr lang="en-US" sz="1600" dirty="0" err="1">
+                <a:solidFill>
+                  <a:srgbClr val="000090"/>
+                </a:solidFill>
+                <a:latin typeface="Monaco"/>
+                <a:cs typeface="Monaco"/>
+              </a:rPr>
+              <a:t>iphonesimulator</a:t>
+            </a:r>
+            <a:r>
+              <a:rPr lang="en-US" sz="1600" dirty="0">
+                <a:solidFill>
+                  <a:srgbClr val="000090"/>
+                </a:solidFill>
+                <a:latin typeface="Monaco"/>
+                <a:cs typeface="Monaco"/>
+              </a:rPr>
+              <a:t> </a:t>
+            </a:r>
+            <a:r>
+              <a:rPr lang="en-US" sz="1600" dirty="0" smtClean="0">
+                <a:solidFill>
+                  <a:srgbClr val="000090"/>
+                </a:solidFill>
+                <a:latin typeface="Monaco"/>
+                <a:cs typeface="Monaco"/>
+              </a:rPr>
+              <a:t>build</a:t>
+            </a:r>
+          </a:p>
+          <a:p>
+            <a:endParaRPr lang="en-US" sz="1600" dirty="0" smtClean="0">
+              <a:solidFill>
+                <a:srgbClr val="000090"/>
+              </a:solidFill>
+              <a:latin typeface="Monaco"/>
+              <a:cs typeface="Monaco"/>
+            </a:endParaRPr>
+          </a:p>
+          <a:p>
+            <a:endParaRPr lang="en-US" sz="1600" dirty="0">
+              <a:solidFill>
+                <a:srgbClr val="000090"/>
+              </a:solidFill>
+              <a:latin typeface="Monaco"/>
+              <a:cs typeface="Monaco"/>
+            </a:endParaRPr>
+          </a:p>
+          <a:p>
+            <a:pPr marL="285750" indent="-285750">
+              <a:buFont typeface="Wingdings" charset="2"/>
+              <a:buChar char="§"/>
+            </a:pPr>
+            <a:r>
+              <a:rPr lang="en-US" sz="2400" dirty="0"/>
+              <a:t>Configure your Jenkins job</a:t>
+            </a:r>
+            <a:endParaRPr lang="en-US" sz="2400" dirty="0"/>
+          </a:p>
+        </p:txBody>
+      </p:sp>
+    </p:spTree>
+    <p:extLst>
+      <p:ext uri="{BB962C8B-B14F-4D97-AF65-F5344CB8AC3E}">
+        <p14:creationId xmlns:p14="http://schemas.microsoft.com/office/powerpoint/2010/main" val="437558875"/>
+      </p:ext>
+    </p:extLst>
+  </p:cSld>
+  <p:clrMapOvr>
+    <a:masterClrMapping/>
+  </p:clrMapOvr>
+  <p:timing>
+    <p:tnLst>
+      <p:par>
+        <p:cTn xmlns:p14="http://schemas.microsoft.com/office/powerpoint/2010/main" id="1" dur="indefinite" restart="never" nodeType="tmRoot"/>
+      </p:par>
+    </p:tnLst>
+  </p:timing>
+</p:sld>
+</file>
+
+<file path=ppt/slides/slide23.xml><?xml version="1.0" encoding="utf-8"?>
+<p:sld xmlns:a="http://schemas.openxmlformats.org/drawingml/2006/main" xmlns:r="http://schemas.openxmlformats.org/officeDocument/2006/relationships" xmlns:p="http://schemas.openxmlformats.org/presentationml/2006/main">
+  <p:cSld>
+    <p:spTree>
+      <p:nvGrpSpPr>
+        <p:cNvPr id="1" name=""/>
+        <p:cNvGrpSpPr/>
+        <p:nvPr/>
+      </p:nvGrpSpPr>
+      <p:grpSpPr>
+        <a:xfrm>
+          <a:off x="0" y="0"/>
+          <a:ext cx="0" cy="0"/>
+          <a:chOff x="0" y="0"/>
+          <a:chExt cx="0" cy="0"/>
+        </a:xfrm>
+      </p:grpSpPr>
+      <p:sp>
+        <p:nvSpPr>
+          <p:cNvPr id="2" name="Title 1"/>
+          <p:cNvSpPr>
+            <a:spLocks noGrp="1"/>
+          </p:cNvSpPr>
+          <p:nvPr>
+            <p:ph type="title"/>
+          </p:nvPr>
+        </p:nvSpPr>
+        <p:spPr>
+          <a:xfrm>
+            <a:off x="457200" y="152400"/>
+            <a:ext cx="8432346" cy="1251062"/>
+          </a:xfrm>
+        </p:spPr>
+        <p:txBody>
+          <a:bodyPr>
+            <a:normAutofit/>
+          </a:bodyPr>
+          <a:lstStyle/>
+          <a:p>
+            <a:r>
+              <a:rPr lang="en-US" sz="4000" dirty="0" smtClean="0"/>
               <a:t>Q&amp;A</a:t>
             </a:r>
             <a:endParaRPr lang="en-US" sz="1800" dirty="0">
@@ -9478,11 +9795,7 @@
           <a:p>
             <a:r>
               <a:rPr lang="en-US" dirty="0" smtClean="0"/>
-              <a:t>What do we have?</a:t>
-            </a:r>
-            <a:r>
-              <a:rPr lang="en-US" dirty="0" smtClean="0"/>
-              <a:t>	</a:t>
+              <a:t>What do we have?	</a:t>
             </a:r>
             <a:endParaRPr lang="en-US" dirty="0"/>
           </a:p>
@@ -9517,11 +9830,7 @@
             </a:pPr>
             <a:r>
               <a:rPr lang="en-US" dirty="0" smtClean="0"/>
-              <a:t>Basic </a:t>
-            </a:r>
-            <a:r>
-              <a:rPr lang="en-US" dirty="0" smtClean="0"/>
-              <a:t>UT patterns: </a:t>
+              <a:t>Basic UT patterns: </a:t>
             </a:r>
             <a:r>
               <a:rPr lang="en-US" i="1" dirty="0" err="1" smtClean="0">
@@ -9792,11 +10101,7 @@
           <a:p>
             <a:r>
               <a:rPr lang="en-US" dirty="0" smtClean="0"/>
-              <a:t>Basic UT patterns</a:t>
-            </a:r>
-            <a:r>
-              <a:rPr lang="en-US" dirty="0" smtClean="0"/>
-              <a:t>	</a:t>
+              <a:t>Basic UT patterns	</a:t>
             </a:r>
             <a:endParaRPr lang="en-US" dirty="0"/>
           </a:p>
@@ -10017,7 +10322,6 @@
               <a:rPr lang="en-US" dirty="0" smtClean="0"/>
               <a:t>Ad the framework to you project:</a:t>
             </a:r>
-            <a:endParaRPr lang="en-US" dirty="0" smtClean="0"/>
           </a:p>
         </p:txBody>
       </p:sp>
@@ -10299,13 +10603,8 @@
             </a:pPr>
             <a:r>
               <a:rPr lang="en-US" dirty="0" smtClean="0"/>
-              <a:t>Set the application linker flags</a:t>
-            </a:r>
-            <a:r>
-              <a:rPr lang="en-US" dirty="0" smtClean="0"/>
-              <a:t>:</a:t>
-            </a:r>
-            <a:endParaRPr lang="en-US" dirty="0" smtClean="0"/>
+              <a:t>Set the application linker flags:</a:t>
+            </a:r>
           </a:p>
         </p:txBody>
       </p:sp>
@@ -10453,13 +10752,8 @@
             </a:r>
             <a:r>
               <a:rPr lang="en-US" dirty="0" smtClean="0"/>
-              <a:t> file</a:t>
-            </a:r>
-            <a:r>
-              <a:rPr lang="en-US" dirty="0" smtClean="0"/>
-              <a:t>:</a:t>
-            </a:r>
-            <a:endParaRPr lang="en-US" dirty="0" smtClean="0"/>
+              <a:t> file:</a:t>
+            </a:r>
           </a:p>
         </p:txBody>
       </p:sp>
@@ -10554,15 +10848,7 @@
           <a:p>
             <a:r>
               <a:rPr lang="en-US" sz="4000" dirty="0" smtClean="0"/>
-              <a:t>Basic </a:t>
-            </a:r>
-            <a:r>
-              <a:rPr lang="en-US" sz="4000" dirty="0" smtClean="0"/>
-              <a:t>unit-test</a:t>
-            </a:r>
-            <a:r>
-              <a:rPr lang="en-US" sz="4000" dirty="0" smtClean="0"/>
-              <a:t> patterns (1)</a:t>
+              <a:t>Basic unit-test patterns (1)</a:t>
             </a:r>
             <a:br>
               <a:rPr lang="en-US" sz="4000" dirty="0" smtClean="0"/>

</xml_diff>